<commit_message>
starting db setup - installed knex and pg
</commit_message>
<xml_diff>
--- a/FrontEnd/src/About the Project.pptx
+++ b/FrontEnd/src/About the Project.pptx
@@ -22,6 +22,12 @@
     <p:sldId id="274" r:id="rId16"/>
     <p:sldId id="275" r:id="rId17"/>
     <p:sldId id="264" r:id="rId18"/>
+    <p:sldId id="280" r:id="rId19"/>
+    <p:sldId id="282" r:id="rId20"/>
+    <p:sldId id="284" r:id="rId21"/>
+    <p:sldId id="285" r:id="rId22"/>
+    <p:sldId id="286" r:id="rId23"/>
+    <p:sldId id="287" r:id="rId24"/>
   </p:sldIdLst>
   <p:sldSz cx="12192000" cy="6858000"/>
   <p:notesSz cx="6858000" cy="9144000"/>
@@ -120,6 +126,11 @@
       </a:defRPr>
     </a:lvl9pPr>
   </p:defaultTextStyle>
+  <p:extLst>
+    <p:ext uri="{EFAFB233-063F-42B5-8137-9DF3F51BA10A}">
+      <p15:sldGuideLst xmlns:p15="http://schemas.microsoft.com/office/powerpoint/2012/main"/>
+    </p:ext>
+  </p:extLst>
 </p:presentation>
 </file>
 
@@ -272,7 +283,7 @@
           <a:p>
             <a:fld id="{CA80000F-CC22-4BFB-97F2-6BFA3E9C2F1F}" type="datetimeFigureOut">
               <a:rPr lang="en-IN" smtClean="0"/>
-              <a:t>26-08-2021</a:t>
+              <a:t>28-09-2021</a:t>
             </a:fld>
             <a:endParaRPr lang="en-IN"/>
           </a:p>
@@ -472,7 +483,7 @@
           <a:p>
             <a:fld id="{CA80000F-CC22-4BFB-97F2-6BFA3E9C2F1F}" type="datetimeFigureOut">
               <a:rPr lang="en-IN" smtClean="0"/>
-              <a:t>26-08-2021</a:t>
+              <a:t>28-09-2021</a:t>
             </a:fld>
             <a:endParaRPr lang="en-IN"/>
           </a:p>
@@ -682,7 +693,7 @@
           <a:p>
             <a:fld id="{CA80000F-CC22-4BFB-97F2-6BFA3E9C2F1F}" type="datetimeFigureOut">
               <a:rPr lang="en-IN" smtClean="0"/>
-              <a:t>26-08-2021</a:t>
+              <a:t>28-09-2021</a:t>
             </a:fld>
             <a:endParaRPr lang="en-IN"/>
           </a:p>
@@ -882,7 +893,7 @@
           <a:p>
             <a:fld id="{CA80000F-CC22-4BFB-97F2-6BFA3E9C2F1F}" type="datetimeFigureOut">
               <a:rPr lang="en-IN" smtClean="0"/>
-              <a:t>26-08-2021</a:t>
+              <a:t>28-09-2021</a:t>
             </a:fld>
             <a:endParaRPr lang="en-IN"/>
           </a:p>
@@ -1158,7 +1169,7 @@
           <a:p>
             <a:fld id="{CA80000F-CC22-4BFB-97F2-6BFA3E9C2F1F}" type="datetimeFigureOut">
               <a:rPr lang="en-IN" smtClean="0"/>
-              <a:t>26-08-2021</a:t>
+              <a:t>28-09-2021</a:t>
             </a:fld>
             <a:endParaRPr lang="en-IN"/>
           </a:p>
@@ -1426,7 +1437,7 @@
           <a:p>
             <a:fld id="{CA80000F-CC22-4BFB-97F2-6BFA3E9C2F1F}" type="datetimeFigureOut">
               <a:rPr lang="en-IN" smtClean="0"/>
-              <a:t>26-08-2021</a:t>
+              <a:t>28-09-2021</a:t>
             </a:fld>
             <a:endParaRPr lang="en-IN"/>
           </a:p>
@@ -1841,7 +1852,7 @@
           <a:p>
             <a:fld id="{CA80000F-CC22-4BFB-97F2-6BFA3E9C2F1F}" type="datetimeFigureOut">
               <a:rPr lang="en-IN" smtClean="0"/>
-              <a:t>26-08-2021</a:t>
+              <a:t>28-09-2021</a:t>
             </a:fld>
             <a:endParaRPr lang="en-IN"/>
           </a:p>
@@ -1983,7 +1994,7 @@
           <a:p>
             <a:fld id="{CA80000F-CC22-4BFB-97F2-6BFA3E9C2F1F}" type="datetimeFigureOut">
               <a:rPr lang="en-IN" smtClean="0"/>
-              <a:t>26-08-2021</a:t>
+              <a:t>28-09-2021</a:t>
             </a:fld>
             <a:endParaRPr lang="en-IN"/>
           </a:p>
@@ -2096,7 +2107,7 @@
           <a:p>
             <a:fld id="{CA80000F-CC22-4BFB-97F2-6BFA3E9C2F1F}" type="datetimeFigureOut">
               <a:rPr lang="en-IN" smtClean="0"/>
-              <a:t>26-08-2021</a:t>
+              <a:t>28-09-2021</a:t>
             </a:fld>
             <a:endParaRPr lang="en-IN"/>
           </a:p>
@@ -2409,7 +2420,7 @@
           <a:p>
             <a:fld id="{CA80000F-CC22-4BFB-97F2-6BFA3E9C2F1F}" type="datetimeFigureOut">
               <a:rPr lang="en-IN" smtClean="0"/>
-              <a:t>26-08-2021</a:t>
+              <a:t>28-09-2021</a:t>
             </a:fld>
             <a:endParaRPr lang="en-IN"/>
           </a:p>
@@ -2698,7 +2709,7 @@
           <a:p>
             <a:fld id="{CA80000F-CC22-4BFB-97F2-6BFA3E9C2F1F}" type="datetimeFigureOut">
               <a:rPr lang="en-IN" smtClean="0"/>
-              <a:t>26-08-2021</a:t>
+              <a:t>28-09-2021</a:t>
             </a:fld>
             <a:endParaRPr lang="en-IN"/>
           </a:p>
@@ -2941,7 +2952,7 @@
           <a:p>
             <a:fld id="{CA80000F-CC22-4BFB-97F2-6BFA3E9C2F1F}" type="datetimeFigureOut">
               <a:rPr lang="en-IN" smtClean="0"/>
-              <a:t>26-08-2021</a:t>
+              <a:t>28-09-2021</a:t>
             </a:fld>
             <a:endParaRPr lang="en-IN"/>
           </a:p>
@@ -4673,6 +4684,232 @@
 </p:sld>
 </file>
 
+<file path=ppt/slides/slide18.xml><?xml version="1.0" encoding="utf-8"?>
+<p:sld xmlns:a="http://schemas.openxmlformats.org/drawingml/2006/main" xmlns:r="http://schemas.openxmlformats.org/officeDocument/2006/relationships" xmlns:p="http://schemas.openxmlformats.org/presentationml/2006/main">
+  <p:cSld>
+    <p:spTree>
+      <p:nvGrpSpPr>
+        <p:cNvPr id="1" name=""/>
+        <p:cNvGrpSpPr/>
+        <p:nvPr/>
+      </p:nvGrpSpPr>
+      <p:grpSpPr>
+        <a:xfrm>
+          <a:off x="0" y="0"/>
+          <a:ext cx="0" cy="0"/>
+          <a:chOff x="0" y="0"/>
+          <a:chExt cx="0" cy="0"/>
+        </a:xfrm>
+      </p:grpSpPr>
+      <p:sp>
+        <p:nvSpPr>
+          <p:cNvPr id="2" name="Title 1">
+            <a:extLst>
+              <a:ext uri="{FF2B5EF4-FFF2-40B4-BE49-F238E27FC236}">
+                <a16:creationId xmlns:a16="http://schemas.microsoft.com/office/drawing/2014/main" id="{8F679980-33E8-4537-818C-0D187271656D}"/>
+              </a:ext>
+            </a:extLst>
+          </p:cNvPr>
+          <p:cNvSpPr>
+            <a:spLocks noGrp="1"/>
+          </p:cNvSpPr>
+          <p:nvPr>
+            <p:ph type="ctrTitle"/>
+          </p:nvPr>
+        </p:nvSpPr>
+        <p:spPr/>
+        <p:txBody>
+          <a:bodyPr/>
+          <a:lstStyle/>
+          <a:p>
+            <a:r>
+              <a:rPr lang="en-US" dirty="0"/>
+              <a:t>Database PostgreSQL</a:t>
+            </a:r>
+            <a:endParaRPr lang="en-IN" dirty="0"/>
+          </a:p>
+        </p:txBody>
+      </p:sp>
+      <p:sp>
+        <p:nvSpPr>
+          <p:cNvPr id="3" name="Subtitle 2">
+            <a:extLst>
+              <a:ext uri="{FF2B5EF4-FFF2-40B4-BE49-F238E27FC236}">
+                <a16:creationId xmlns:a16="http://schemas.microsoft.com/office/drawing/2014/main" id="{28D0310F-BFAC-4102-B79F-D4E5A1748119}"/>
+              </a:ext>
+            </a:extLst>
+          </p:cNvPr>
+          <p:cNvSpPr>
+            <a:spLocks noGrp="1"/>
+          </p:cNvSpPr>
+          <p:nvPr>
+            <p:ph type="subTitle" idx="1"/>
+          </p:nvPr>
+        </p:nvSpPr>
+        <p:spPr/>
+        <p:txBody>
+          <a:bodyPr/>
+          <a:lstStyle/>
+          <a:p>
+            <a:r>
+              <a:rPr lang="en-US" dirty="0"/>
+              <a:t>Image Recognition Tool</a:t>
+            </a:r>
+            <a:endParaRPr lang="en-IN" dirty="0"/>
+          </a:p>
+        </p:txBody>
+      </p:sp>
+    </p:spTree>
+    <p:extLst>
+      <p:ext uri="{BB962C8B-B14F-4D97-AF65-F5344CB8AC3E}">
+        <p14:creationId xmlns:p14="http://schemas.microsoft.com/office/powerpoint/2010/main" val="1157829987"/>
+      </p:ext>
+    </p:extLst>
+  </p:cSld>
+  <p:clrMapOvr>
+    <a:masterClrMapping/>
+  </p:clrMapOvr>
+</p:sld>
+</file>
+
+<file path=ppt/slides/slide19.xml><?xml version="1.0" encoding="utf-8"?>
+<p:sld xmlns:a="http://schemas.openxmlformats.org/drawingml/2006/main" xmlns:r="http://schemas.openxmlformats.org/officeDocument/2006/relationships" xmlns:p="http://schemas.openxmlformats.org/presentationml/2006/main">
+  <p:cSld>
+    <p:spTree>
+      <p:nvGrpSpPr>
+        <p:cNvPr id="1" name=""/>
+        <p:cNvGrpSpPr/>
+        <p:nvPr/>
+      </p:nvGrpSpPr>
+      <p:grpSpPr>
+        <a:xfrm>
+          <a:off x="0" y="0"/>
+          <a:ext cx="0" cy="0"/>
+          <a:chOff x="0" y="0"/>
+          <a:chExt cx="0" cy="0"/>
+        </a:xfrm>
+      </p:grpSpPr>
+      <p:sp>
+        <p:nvSpPr>
+          <p:cNvPr id="2" name="Title 1">
+            <a:extLst>
+              <a:ext uri="{FF2B5EF4-FFF2-40B4-BE49-F238E27FC236}">
+                <a16:creationId xmlns:a16="http://schemas.microsoft.com/office/drawing/2014/main" id="{0F8A4BD8-9D7A-4F86-A13B-FC7E4ECC73A0}"/>
+              </a:ext>
+            </a:extLst>
+          </p:cNvPr>
+          <p:cNvSpPr>
+            <a:spLocks noGrp="1"/>
+          </p:cNvSpPr>
+          <p:nvPr>
+            <p:ph type="title"/>
+          </p:nvPr>
+        </p:nvSpPr>
+        <p:spPr/>
+        <p:txBody>
+          <a:bodyPr/>
+          <a:lstStyle/>
+          <a:p>
+            <a:r>
+              <a:rPr lang="en-US" b="1" i="1" u="sng" dirty="0"/>
+              <a:t>Command Line Commands</a:t>
+            </a:r>
+            <a:endParaRPr lang="en-IN" b="1" i="1" u="sng" dirty="0"/>
+          </a:p>
+        </p:txBody>
+      </p:sp>
+      <p:sp>
+        <p:nvSpPr>
+          <p:cNvPr id="3" name="Content Placeholder 2">
+            <a:extLst>
+              <a:ext uri="{FF2B5EF4-FFF2-40B4-BE49-F238E27FC236}">
+                <a16:creationId xmlns:a16="http://schemas.microsoft.com/office/drawing/2014/main" id="{9CBF8E37-04B3-446B-8744-21A4574137AD}"/>
+              </a:ext>
+            </a:extLst>
+          </p:cNvPr>
+          <p:cNvSpPr>
+            <a:spLocks noGrp="1"/>
+          </p:cNvSpPr>
+          <p:nvPr>
+            <p:ph idx="1"/>
+          </p:nvPr>
+        </p:nvSpPr>
+        <p:spPr/>
+        <p:txBody>
+          <a:bodyPr>
+            <a:normAutofit/>
+          </a:bodyPr>
+          <a:lstStyle/>
+          <a:p>
+            <a:pPr marL="0" indent="0">
+              <a:buNone/>
+            </a:pPr>
+            <a:r>
+              <a:rPr lang="en-US" b="1" i="1" u="sng" dirty="0"/>
+              <a:t>1  psql –U &lt;username_postgres&gt; </a:t>
+            </a:r>
+            <a:r>
+              <a:rPr lang="en-US" dirty="0"/>
+              <a:t>– To run postgreSql terminal.</a:t>
+            </a:r>
+          </a:p>
+          <a:p>
+            <a:pPr marL="0" indent="0">
+              <a:buNone/>
+            </a:pPr>
+            <a:r>
+              <a:rPr lang="en-US" b="1" i="1" u="sng" dirty="0"/>
+              <a:t>2  \c &lt;database_name&gt; </a:t>
+            </a:r>
+            <a:r>
+              <a:rPr lang="en-US" dirty="0"/>
+              <a:t>- To select some specific db.</a:t>
+            </a:r>
+          </a:p>
+          <a:p>
+            <a:pPr marL="0" indent="0">
+              <a:buNone/>
+            </a:pPr>
+            <a:r>
+              <a:rPr lang="en-US" b="1" i="1" u="sng" dirty="0"/>
+              <a:t>3  \d </a:t>
+            </a:r>
+            <a:r>
+              <a:rPr lang="en-US" dirty="0"/>
+              <a:t>– To display all relations schema’s of the currently selected db.</a:t>
+            </a:r>
+          </a:p>
+          <a:p>
+            <a:pPr marL="0" indent="0">
+              <a:buNone/>
+            </a:pPr>
+            <a:r>
+              <a:rPr lang="en-US" b="1" i="1" u="sng" dirty="0"/>
+              <a:t>4  \q </a:t>
+            </a:r>
+            <a:r>
+              <a:rPr lang="en-US" dirty="0"/>
+              <a:t>– To quit from postgreSql terminal.</a:t>
+            </a:r>
+          </a:p>
+          <a:p>
+            <a:endParaRPr lang="en-US" dirty="0"/>
+          </a:p>
+        </p:txBody>
+      </p:sp>
+    </p:spTree>
+    <p:extLst>
+      <p:ext uri="{BB962C8B-B14F-4D97-AF65-F5344CB8AC3E}">
+        <p14:creationId xmlns:p14="http://schemas.microsoft.com/office/powerpoint/2010/main" val="1190075117"/>
+      </p:ext>
+    </p:extLst>
+  </p:cSld>
+  <p:clrMapOvr>
+    <a:masterClrMapping/>
+  </p:clrMapOvr>
+</p:sld>
+</file>
+
 <file path=ppt/slides/slide2.xml><?xml version="1.0" encoding="utf-8"?>
 <p:sld xmlns:a="http://schemas.openxmlformats.org/drawingml/2006/main" xmlns:r="http://schemas.openxmlformats.org/officeDocument/2006/relationships" xmlns:p="http://schemas.openxmlformats.org/presentationml/2006/main">
   <p:cSld>
@@ -4824,6 +5061,586 @@
     <p:extLst>
       <p:ext uri="{BB962C8B-B14F-4D97-AF65-F5344CB8AC3E}">
         <p14:creationId xmlns:p14="http://schemas.microsoft.com/office/powerpoint/2010/main" val="2843916553"/>
+      </p:ext>
+    </p:extLst>
+  </p:cSld>
+  <p:clrMapOvr>
+    <a:masterClrMapping/>
+  </p:clrMapOvr>
+</p:sld>
+</file>
+
+<file path=ppt/slides/slide20.xml><?xml version="1.0" encoding="utf-8"?>
+<p:sld xmlns:a="http://schemas.openxmlformats.org/drawingml/2006/main" xmlns:r="http://schemas.openxmlformats.org/officeDocument/2006/relationships" xmlns:p="http://schemas.openxmlformats.org/presentationml/2006/main">
+  <p:cSld>
+    <p:spTree>
+      <p:nvGrpSpPr>
+        <p:cNvPr id="1" name=""/>
+        <p:cNvGrpSpPr/>
+        <p:nvPr/>
+      </p:nvGrpSpPr>
+      <p:grpSpPr>
+        <a:xfrm>
+          <a:off x="0" y="0"/>
+          <a:ext cx="0" cy="0"/>
+          <a:chOff x="0" y="0"/>
+          <a:chExt cx="0" cy="0"/>
+        </a:xfrm>
+      </p:grpSpPr>
+      <p:sp>
+        <p:nvSpPr>
+          <p:cNvPr id="2" name="Title 1">
+            <a:extLst>
+              <a:ext uri="{FF2B5EF4-FFF2-40B4-BE49-F238E27FC236}">
+                <a16:creationId xmlns:a16="http://schemas.microsoft.com/office/drawing/2014/main" id="{0F8A4BD8-9D7A-4F86-A13B-FC7E4ECC73A0}"/>
+              </a:ext>
+            </a:extLst>
+          </p:cNvPr>
+          <p:cNvSpPr>
+            <a:spLocks noGrp="1"/>
+          </p:cNvSpPr>
+          <p:nvPr>
+            <p:ph type="title"/>
+          </p:nvPr>
+        </p:nvSpPr>
+        <p:spPr>
+          <a:xfrm>
+            <a:off x="242637" y="365125"/>
+            <a:ext cx="10515600" cy="1325563"/>
+          </a:xfrm>
+        </p:spPr>
+        <p:txBody>
+          <a:bodyPr/>
+          <a:lstStyle/>
+          <a:p>
+            <a:r>
+              <a:rPr lang="en-US" b="1" i="1" u="sng" dirty="0"/>
+              <a:t>Creating New Table</a:t>
+            </a:r>
+            <a:endParaRPr lang="en-IN" b="1" i="1" u="sng" dirty="0"/>
+          </a:p>
+        </p:txBody>
+      </p:sp>
+      <p:pic>
+        <p:nvPicPr>
+          <p:cNvPr id="7" name="Picture 6">
+            <a:extLst>
+              <a:ext uri="{FF2B5EF4-FFF2-40B4-BE49-F238E27FC236}">
+                <a16:creationId xmlns:a16="http://schemas.microsoft.com/office/drawing/2014/main" id="{18A3CC1D-F3B3-409E-9221-A4259930CFE1}"/>
+              </a:ext>
+            </a:extLst>
+          </p:cNvPr>
+          <p:cNvPicPr>
+            <a:picLocks noChangeAspect="1"/>
+          </p:cNvPicPr>
+          <p:nvPr/>
+        </p:nvPicPr>
+        <p:blipFill>
+          <a:blip r:embed="rId2">
+            <a:extLst>
+              <a:ext uri="{28A0092B-C50C-407E-A947-70E740481C1C}">
+                <a14:useLocalDpi xmlns:a14="http://schemas.microsoft.com/office/drawing/2010/main" val="0"/>
+              </a:ext>
+            </a:extLst>
+          </a:blip>
+          <a:stretch>
+            <a:fillRect/>
+          </a:stretch>
+        </p:blipFill>
+        <p:spPr>
+          <a:xfrm>
+            <a:off x="242637" y="1979446"/>
+            <a:ext cx="11706726" cy="1949991"/>
+          </a:xfrm>
+          <a:prstGeom prst="rect">
+            <a:avLst/>
+          </a:prstGeom>
+        </p:spPr>
+      </p:pic>
+      <p:pic>
+        <p:nvPicPr>
+          <p:cNvPr id="11" name="Picture 10">
+            <a:extLst>
+              <a:ext uri="{FF2B5EF4-FFF2-40B4-BE49-F238E27FC236}">
+                <a16:creationId xmlns:a16="http://schemas.microsoft.com/office/drawing/2014/main" id="{9C901ED4-4A8D-49FC-9512-C79028254759}"/>
+              </a:ext>
+            </a:extLst>
+          </p:cNvPr>
+          <p:cNvPicPr>
+            <a:picLocks noChangeAspect="1"/>
+          </p:cNvPicPr>
+          <p:nvPr/>
+        </p:nvPicPr>
+        <p:blipFill>
+          <a:blip r:embed="rId3">
+            <a:extLst>
+              <a:ext uri="{28A0092B-C50C-407E-A947-70E740481C1C}">
+                <a14:useLocalDpi xmlns:a14="http://schemas.microsoft.com/office/drawing/2010/main" val="0"/>
+              </a:ext>
+            </a:extLst>
+          </a:blip>
+          <a:stretch>
+            <a:fillRect/>
+          </a:stretch>
+        </p:blipFill>
+        <p:spPr>
+          <a:xfrm>
+            <a:off x="242637" y="4218195"/>
+            <a:ext cx="4038600" cy="1734805"/>
+          </a:xfrm>
+          <a:prstGeom prst="rect">
+            <a:avLst/>
+          </a:prstGeom>
+        </p:spPr>
+      </p:pic>
+    </p:spTree>
+    <p:extLst>
+      <p:ext uri="{BB962C8B-B14F-4D97-AF65-F5344CB8AC3E}">
+        <p14:creationId xmlns:p14="http://schemas.microsoft.com/office/powerpoint/2010/main" val="3833659714"/>
+      </p:ext>
+    </p:extLst>
+  </p:cSld>
+  <p:clrMapOvr>
+    <a:masterClrMapping/>
+  </p:clrMapOvr>
+</p:sld>
+</file>
+
+<file path=ppt/slides/slide21.xml><?xml version="1.0" encoding="utf-8"?>
+<p:sld xmlns:a="http://schemas.openxmlformats.org/drawingml/2006/main" xmlns:r="http://schemas.openxmlformats.org/officeDocument/2006/relationships" xmlns:p="http://schemas.openxmlformats.org/presentationml/2006/main">
+  <p:cSld>
+    <p:spTree>
+      <p:nvGrpSpPr>
+        <p:cNvPr id="1" name=""/>
+        <p:cNvGrpSpPr/>
+        <p:nvPr/>
+      </p:nvGrpSpPr>
+      <p:grpSpPr>
+        <a:xfrm>
+          <a:off x="0" y="0"/>
+          <a:ext cx="0" cy="0"/>
+          <a:chOff x="0" y="0"/>
+          <a:chExt cx="0" cy="0"/>
+        </a:xfrm>
+      </p:grpSpPr>
+      <p:sp>
+        <p:nvSpPr>
+          <p:cNvPr id="2" name="Title 1">
+            <a:extLst>
+              <a:ext uri="{FF2B5EF4-FFF2-40B4-BE49-F238E27FC236}">
+                <a16:creationId xmlns:a16="http://schemas.microsoft.com/office/drawing/2014/main" id="{0F8A4BD8-9D7A-4F86-A13B-FC7E4ECC73A0}"/>
+              </a:ext>
+            </a:extLst>
+          </p:cNvPr>
+          <p:cNvSpPr>
+            <a:spLocks noGrp="1"/>
+          </p:cNvSpPr>
+          <p:nvPr>
+            <p:ph type="title"/>
+          </p:nvPr>
+        </p:nvSpPr>
+        <p:spPr>
+          <a:xfrm>
+            <a:off x="242637" y="365125"/>
+            <a:ext cx="10515600" cy="1325563"/>
+          </a:xfrm>
+        </p:spPr>
+        <p:txBody>
+          <a:bodyPr/>
+          <a:lstStyle/>
+          <a:p>
+            <a:r>
+              <a:rPr lang="en-US" b="1" i="1" u="sng" dirty="0"/>
+              <a:t>Inserting Values in Table</a:t>
+            </a:r>
+            <a:endParaRPr lang="en-IN" b="1" i="1" u="sng" dirty="0"/>
+          </a:p>
+        </p:txBody>
+      </p:sp>
+      <p:pic>
+        <p:nvPicPr>
+          <p:cNvPr id="6" name="Picture 5">
+            <a:extLst>
+              <a:ext uri="{FF2B5EF4-FFF2-40B4-BE49-F238E27FC236}">
+                <a16:creationId xmlns:a16="http://schemas.microsoft.com/office/drawing/2014/main" id="{8DD3D025-E386-44D3-944B-A828B6897E27}"/>
+              </a:ext>
+            </a:extLst>
+          </p:cNvPr>
+          <p:cNvPicPr>
+            <a:picLocks noChangeAspect="1"/>
+          </p:cNvPicPr>
+          <p:nvPr/>
+        </p:nvPicPr>
+        <p:blipFill>
+          <a:blip r:embed="rId2">
+            <a:extLst>
+              <a:ext uri="{28A0092B-C50C-407E-A947-70E740481C1C}">
+                <a14:useLocalDpi xmlns:a14="http://schemas.microsoft.com/office/drawing/2010/main" val="0"/>
+              </a:ext>
+            </a:extLst>
+          </a:blip>
+          <a:stretch>
+            <a:fillRect/>
+          </a:stretch>
+        </p:blipFill>
+        <p:spPr>
+          <a:xfrm>
+            <a:off x="242637" y="1725716"/>
+            <a:ext cx="9772650" cy="2457450"/>
+          </a:xfrm>
+          <a:prstGeom prst="rect">
+            <a:avLst/>
+          </a:prstGeom>
+        </p:spPr>
+      </p:pic>
+      <p:pic>
+        <p:nvPicPr>
+          <p:cNvPr id="9" name="Picture 8">
+            <a:extLst>
+              <a:ext uri="{FF2B5EF4-FFF2-40B4-BE49-F238E27FC236}">
+                <a16:creationId xmlns:a16="http://schemas.microsoft.com/office/drawing/2014/main" id="{382E80A7-BF35-4632-8CB9-C5D752466A61}"/>
+              </a:ext>
+            </a:extLst>
+          </p:cNvPr>
+          <p:cNvPicPr>
+            <a:picLocks noChangeAspect="1"/>
+          </p:cNvPicPr>
+          <p:nvPr/>
+        </p:nvPicPr>
+        <p:blipFill>
+          <a:blip r:embed="rId3">
+            <a:extLst>
+              <a:ext uri="{28A0092B-C50C-407E-A947-70E740481C1C}">
+                <a14:useLocalDpi xmlns:a14="http://schemas.microsoft.com/office/drawing/2010/main" val="0"/>
+              </a:ext>
+            </a:extLst>
+          </a:blip>
+          <a:stretch>
+            <a:fillRect/>
+          </a:stretch>
+        </p:blipFill>
+        <p:spPr>
+          <a:xfrm>
+            <a:off x="242637" y="4035425"/>
+            <a:ext cx="9277350" cy="2457450"/>
+          </a:xfrm>
+          <a:prstGeom prst="rect">
+            <a:avLst/>
+          </a:prstGeom>
+        </p:spPr>
+      </p:pic>
+    </p:spTree>
+    <p:extLst>
+      <p:ext uri="{BB962C8B-B14F-4D97-AF65-F5344CB8AC3E}">
+        <p14:creationId xmlns:p14="http://schemas.microsoft.com/office/powerpoint/2010/main" val="3797300893"/>
+      </p:ext>
+    </p:extLst>
+  </p:cSld>
+  <p:clrMapOvr>
+    <a:masterClrMapping/>
+  </p:clrMapOvr>
+</p:sld>
+</file>
+
+<file path=ppt/slides/slide22.xml><?xml version="1.0" encoding="utf-8"?>
+<p:sld xmlns:a="http://schemas.openxmlformats.org/drawingml/2006/main" xmlns:r="http://schemas.openxmlformats.org/officeDocument/2006/relationships" xmlns:p="http://schemas.openxmlformats.org/presentationml/2006/main">
+  <p:cSld>
+    <p:spTree>
+      <p:nvGrpSpPr>
+        <p:cNvPr id="1" name=""/>
+        <p:cNvGrpSpPr/>
+        <p:nvPr/>
+      </p:nvGrpSpPr>
+      <p:grpSpPr>
+        <a:xfrm>
+          <a:off x="0" y="0"/>
+          <a:ext cx="0" cy="0"/>
+          <a:chOff x="0" y="0"/>
+          <a:chExt cx="0" cy="0"/>
+        </a:xfrm>
+      </p:grpSpPr>
+      <p:sp>
+        <p:nvSpPr>
+          <p:cNvPr id="2" name="Title 1">
+            <a:extLst>
+              <a:ext uri="{FF2B5EF4-FFF2-40B4-BE49-F238E27FC236}">
+                <a16:creationId xmlns:a16="http://schemas.microsoft.com/office/drawing/2014/main" id="{0F8A4BD8-9D7A-4F86-A13B-FC7E4ECC73A0}"/>
+              </a:ext>
+            </a:extLst>
+          </p:cNvPr>
+          <p:cNvSpPr>
+            <a:spLocks noGrp="1"/>
+          </p:cNvSpPr>
+          <p:nvPr>
+            <p:ph type="title"/>
+          </p:nvPr>
+        </p:nvSpPr>
+        <p:spPr>
+          <a:xfrm>
+            <a:off x="242637" y="400153"/>
+            <a:ext cx="10515600" cy="1325563"/>
+          </a:xfrm>
+        </p:spPr>
+        <p:txBody>
+          <a:bodyPr/>
+          <a:lstStyle/>
+          <a:p>
+            <a:r>
+              <a:rPr lang="en-US" b="1" i="1" u="sng" dirty="0"/>
+              <a:t>Alter and Update</a:t>
+            </a:r>
+            <a:endParaRPr lang="en-IN" b="1" i="1" u="sng" dirty="0"/>
+          </a:p>
+        </p:txBody>
+      </p:sp>
+      <p:pic>
+        <p:nvPicPr>
+          <p:cNvPr id="4" name="Picture 3">
+            <a:extLst>
+              <a:ext uri="{FF2B5EF4-FFF2-40B4-BE49-F238E27FC236}">
+                <a16:creationId xmlns:a16="http://schemas.microsoft.com/office/drawing/2014/main" id="{D4AD8EC5-056D-40BE-B94D-7A3EBBA4E958}"/>
+              </a:ext>
+            </a:extLst>
+          </p:cNvPr>
+          <p:cNvPicPr>
+            <a:picLocks noChangeAspect="1"/>
+          </p:cNvPicPr>
+          <p:nvPr/>
+        </p:nvPicPr>
+        <p:blipFill>
+          <a:blip r:embed="rId2">
+            <a:extLst>
+              <a:ext uri="{28A0092B-C50C-407E-A947-70E740481C1C}">
+                <a14:useLocalDpi xmlns:a14="http://schemas.microsoft.com/office/drawing/2010/main" val="0"/>
+              </a:ext>
+            </a:extLst>
+          </a:blip>
+          <a:stretch>
+            <a:fillRect/>
+          </a:stretch>
+        </p:blipFill>
+        <p:spPr>
+          <a:xfrm>
+            <a:off x="350419" y="1725716"/>
+            <a:ext cx="6991350" cy="2038350"/>
+          </a:xfrm>
+          <a:prstGeom prst="rect">
+            <a:avLst/>
+          </a:prstGeom>
+        </p:spPr>
+      </p:pic>
+      <p:pic>
+        <p:nvPicPr>
+          <p:cNvPr id="7" name="Picture 6">
+            <a:extLst>
+              <a:ext uri="{FF2B5EF4-FFF2-40B4-BE49-F238E27FC236}">
+                <a16:creationId xmlns:a16="http://schemas.microsoft.com/office/drawing/2014/main" id="{4A2D6FC8-AEEC-4B68-89AB-D21342F93980}"/>
+              </a:ext>
+            </a:extLst>
+          </p:cNvPr>
+          <p:cNvPicPr>
+            <a:picLocks noChangeAspect="1"/>
+          </p:cNvPicPr>
+          <p:nvPr/>
+        </p:nvPicPr>
+        <p:blipFill>
+          <a:blip r:embed="rId3">
+            <a:extLst>
+              <a:ext uri="{28A0092B-C50C-407E-A947-70E740481C1C}">
+                <a14:useLocalDpi xmlns:a14="http://schemas.microsoft.com/office/drawing/2010/main" val="0"/>
+              </a:ext>
+            </a:extLst>
+          </a:blip>
+          <a:stretch>
+            <a:fillRect/>
+          </a:stretch>
+        </p:blipFill>
+        <p:spPr>
+          <a:xfrm>
+            <a:off x="350419" y="3711198"/>
+            <a:ext cx="5676900" cy="2857500"/>
+          </a:xfrm>
+          <a:prstGeom prst="rect">
+            <a:avLst/>
+          </a:prstGeom>
+        </p:spPr>
+      </p:pic>
+      <p:pic>
+        <p:nvPicPr>
+          <p:cNvPr id="10" name="Picture 9">
+            <a:extLst>
+              <a:ext uri="{FF2B5EF4-FFF2-40B4-BE49-F238E27FC236}">
+                <a16:creationId xmlns:a16="http://schemas.microsoft.com/office/drawing/2014/main" id="{BD4BBC04-8F13-4486-86C2-8963FBA74DA8}"/>
+              </a:ext>
+            </a:extLst>
+          </p:cNvPr>
+          <p:cNvPicPr>
+            <a:picLocks noChangeAspect="1"/>
+          </p:cNvPicPr>
+          <p:nvPr/>
+        </p:nvPicPr>
+        <p:blipFill>
+          <a:blip r:embed="rId4">
+            <a:extLst>
+              <a:ext uri="{28A0092B-C50C-407E-A947-70E740481C1C}">
+                <a14:useLocalDpi xmlns:a14="http://schemas.microsoft.com/office/drawing/2010/main" val="0"/>
+              </a:ext>
+            </a:extLst>
+          </a:blip>
+          <a:stretch>
+            <a:fillRect/>
+          </a:stretch>
+        </p:blipFill>
+        <p:spPr>
+          <a:xfrm>
+            <a:off x="6019800" y="3711196"/>
+            <a:ext cx="6172200" cy="2857501"/>
+          </a:xfrm>
+          <a:prstGeom prst="rect">
+            <a:avLst/>
+          </a:prstGeom>
+        </p:spPr>
+      </p:pic>
+    </p:spTree>
+    <p:extLst>
+      <p:ext uri="{BB962C8B-B14F-4D97-AF65-F5344CB8AC3E}">
+        <p14:creationId xmlns:p14="http://schemas.microsoft.com/office/powerpoint/2010/main" val="2476330965"/>
+      </p:ext>
+    </p:extLst>
+  </p:cSld>
+  <p:clrMapOvr>
+    <a:masterClrMapping/>
+  </p:clrMapOvr>
+</p:sld>
+</file>
+
+<file path=ppt/slides/slide23.xml><?xml version="1.0" encoding="utf-8"?>
+<p:sld xmlns:a="http://schemas.openxmlformats.org/drawingml/2006/main" xmlns:r="http://schemas.openxmlformats.org/officeDocument/2006/relationships" xmlns:p="http://schemas.openxmlformats.org/presentationml/2006/main">
+  <p:cSld>
+    <p:spTree>
+      <p:nvGrpSpPr>
+        <p:cNvPr id="1" name=""/>
+        <p:cNvGrpSpPr/>
+        <p:nvPr/>
+      </p:nvGrpSpPr>
+      <p:grpSpPr>
+        <a:xfrm>
+          <a:off x="0" y="0"/>
+          <a:ext cx="0" cy="0"/>
+          <a:chOff x="0" y="0"/>
+          <a:chExt cx="0" cy="0"/>
+        </a:xfrm>
+      </p:grpSpPr>
+      <p:sp>
+        <p:nvSpPr>
+          <p:cNvPr id="2" name="Title 1">
+            <a:extLst>
+              <a:ext uri="{FF2B5EF4-FFF2-40B4-BE49-F238E27FC236}">
+                <a16:creationId xmlns:a16="http://schemas.microsoft.com/office/drawing/2014/main" id="{0F8A4BD8-9D7A-4F86-A13B-FC7E4ECC73A0}"/>
+              </a:ext>
+            </a:extLst>
+          </p:cNvPr>
+          <p:cNvSpPr>
+            <a:spLocks noGrp="1"/>
+          </p:cNvSpPr>
+          <p:nvPr>
+            <p:ph type="title"/>
+          </p:nvPr>
+        </p:nvSpPr>
+        <p:spPr>
+          <a:xfrm>
+            <a:off x="242637" y="400153"/>
+            <a:ext cx="10515600" cy="1325563"/>
+          </a:xfrm>
+        </p:spPr>
+        <p:txBody>
+          <a:bodyPr/>
+          <a:lstStyle/>
+          <a:p>
+            <a:r>
+              <a:rPr lang="en-US" b="1" i="1" u="sng" dirty="0"/>
+              <a:t>Conditional Sections</a:t>
+            </a:r>
+            <a:endParaRPr lang="en-IN" b="1" i="1" u="sng" dirty="0"/>
+          </a:p>
+        </p:txBody>
+      </p:sp>
+      <p:pic>
+        <p:nvPicPr>
+          <p:cNvPr id="5" name="Picture 4">
+            <a:extLst>
+              <a:ext uri="{FF2B5EF4-FFF2-40B4-BE49-F238E27FC236}">
+                <a16:creationId xmlns:a16="http://schemas.microsoft.com/office/drawing/2014/main" id="{D36E5E60-532D-4804-9E19-732AA2B436D5}"/>
+              </a:ext>
+            </a:extLst>
+          </p:cNvPr>
+          <p:cNvPicPr>
+            <a:picLocks noChangeAspect="1"/>
+          </p:cNvPicPr>
+          <p:nvPr/>
+        </p:nvPicPr>
+        <p:blipFill>
+          <a:blip r:embed="rId2">
+            <a:extLst>
+              <a:ext uri="{28A0092B-C50C-407E-A947-70E740481C1C}">
+                <a14:useLocalDpi xmlns:a14="http://schemas.microsoft.com/office/drawing/2010/main" val="0"/>
+              </a:ext>
+            </a:extLst>
+          </a:blip>
+          <a:stretch>
+            <a:fillRect/>
+          </a:stretch>
+        </p:blipFill>
+        <p:spPr>
+          <a:xfrm>
+            <a:off x="242637" y="1536424"/>
+            <a:ext cx="5029200" cy="2857500"/>
+          </a:xfrm>
+          <a:prstGeom prst="rect">
+            <a:avLst/>
+          </a:prstGeom>
+        </p:spPr>
+      </p:pic>
+      <p:pic>
+        <p:nvPicPr>
+          <p:cNvPr id="12" name="Picture 11">
+            <a:extLst>
+              <a:ext uri="{FF2B5EF4-FFF2-40B4-BE49-F238E27FC236}">
+                <a16:creationId xmlns:a16="http://schemas.microsoft.com/office/drawing/2014/main" id="{188E0C8A-2640-4BF1-9454-A2A9C6DE3BF0}"/>
+              </a:ext>
+            </a:extLst>
+          </p:cNvPr>
+          <p:cNvPicPr>
+            <a:picLocks noChangeAspect="1"/>
+          </p:cNvPicPr>
+          <p:nvPr/>
+        </p:nvPicPr>
+        <p:blipFill>
+          <a:blip r:embed="rId3">
+            <a:extLst>
+              <a:ext uri="{28A0092B-C50C-407E-A947-70E740481C1C}">
+                <a14:useLocalDpi xmlns:a14="http://schemas.microsoft.com/office/drawing/2010/main" val="0"/>
+              </a:ext>
+            </a:extLst>
+          </a:blip>
+          <a:stretch>
+            <a:fillRect/>
+          </a:stretch>
+        </p:blipFill>
+        <p:spPr>
+          <a:xfrm>
+            <a:off x="5271837" y="1536424"/>
+            <a:ext cx="4191000" cy="2857500"/>
+          </a:xfrm>
+          <a:prstGeom prst="rect">
+            <a:avLst/>
+          </a:prstGeom>
+        </p:spPr>
+      </p:pic>
+    </p:spTree>
+    <p:extLst>
+      <p:ext uri="{BB962C8B-B14F-4D97-AF65-F5344CB8AC3E}">
+        <p14:creationId xmlns:p14="http://schemas.microsoft.com/office/powerpoint/2010/main" val="1098290257"/>
       </p:ext>
     </p:extLst>
   </p:cSld>

</xml_diff>